<commit_message>
added office hrs detail
</commit_message>
<xml_diff>
--- a/Slides/Module 01.1 Course Introduction.pptx
+++ b/Slides/Module 01.1 Course Introduction.pptx
@@ -3667,7 +3667,7 @@
           <a:p>
             <a:fld id="{7C7E5181-6CF5-45F7-A87A-E0E0B1FD7549}" type="datetimeFigureOut">
               <a:rPr lang="en-US" smtClean="0"/>
-              <a:t>8/30/2023</a:t>
+              <a:t>9/4/2023</a:t>
             </a:fld>
             <a:endParaRPr lang="en-US"/>
           </a:p>
@@ -4852,7 +4852,7 @@
           <a:p>
             <a:fld id="{5D2A64DE-480B-420F-9649-4F8E696E08E0}" type="datetime1">
               <a:rPr lang="en-US" smtClean="0"/>
-              <a:t>8/30/2023</a:t>
+              <a:t>9/4/2023</a:t>
             </a:fld>
             <a:endParaRPr lang="en-US"/>
           </a:p>
@@ -5086,7 +5086,7 @@
           <a:p>
             <a:fld id="{0D3616D0-8311-4107-9726-6B805E7D05BA}" type="datetime1">
               <a:rPr lang="en-US" smtClean="0"/>
-              <a:t>8/30/2023</a:t>
+              <a:t>9/4/2023</a:t>
             </a:fld>
             <a:endParaRPr lang="en-US"/>
           </a:p>
@@ -5294,7 +5294,7 @@
           <a:p>
             <a:fld id="{3BC2557A-5C88-417A-A763-5AC779462A5F}" type="datetime1">
               <a:rPr lang="en-US" smtClean="0"/>
-              <a:t>8/30/2023</a:t>
+              <a:t>9/4/2023</a:t>
             </a:fld>
             <a:endParaRPr lang="en-US"/>
           </a:p>
@@ -5818,7 +5818,7 @@
           <a:p>
             <a:fld id="{07C7BFD4-467E-4EDE-93EA-052F5B39A4E5}" type="datetime1">
               <a:rPr lang="en-US" smtClean="0"/>
-              <a:t>8/30/2023</a:t>
+              <a:t>9/4/2023</a:t>
             </a:fld>
             <a:endParaRPr lang="en-US"/>
           </a:p>
@@ -6131,7 +6131,7 @@
           <a:p>
             <a:fld id="{A533CBE2-D5BE-47AC-ADC2-9CDFC1D0CF90}" type="datetime1">
               <a:rPr lang="en-US" smtClean="0"/>
-              <a:t>8/30/2023</a:t>
+              <a:t>9/4/2023</a:t>
             </a:fld>
             <a:endParaRPr lang="en-US"/>
           </a:p>
@@ -6432,7 +6432,7 @@
           <a:p>
             <a:fld id="{39B7EDB1-CE74-4951-85A2-0B01C2128E28}" type="datetime1">
               <a:rPr lang="en-US" smtClean="0"/>
-              <a:t>8/30/2023</a:t>
+              <a:t>9/4/2023</a:t>
             </a:fld>
             <a:endParaRPr lang="en-US"/>
           </a:p>
@@ -6880,7 +6880,7 @@
           <a:p>
             <a:fld id="{2BC7EB92-A5C2-4807-A9DC-9EDE6CBFB241}" type="datetime1">
               <a:rPr lang="en-US" smtClean="0"/>
-              <a:t>8/30/2023</a:t>
+              <a:t>9/4/2023</a:t>
             </a:fld>
             <a:endParaRPr lang="en-US"/>
           </a:p>
@@ -7026,7 +7026,7 @@
           <a:p>
             <a:fld id="{109E55A0-C911-4F03-82FC-7E5926047D46}" type="datetime1">
               <a:rPr lang="en-US" smtClean="0"/>
-              <a:t>8/30/2023</a:t>
+              <a:t>9/4/2023</a:t>
             </a:fld>
             <a:endParaRPr lang="en-US"/>
           </a:p>
@@ -7175,7 +7175,7 @@
           <a:p>
             <a:fld id="{2B7B7EE0-7771-4CD5-9B2B-3550753A54A1}" type="datetime1">
               <a:rPr lang="en-US" smtClean="0"/>
-              <a:t>8/30/2023</a:t>
+              <a:t>9/4/2023</a:t>
             </a:fld>
             <a:endParaRPr lang="en-US"/>
           </a:p>
@@ -7486,7 +7486,7 @@
           <a:p>
             <a:fld id="{F8B318B3-0E87-4416-A9B8-D891968C2727}" type="datetime1">
               <a:rPr lang="en-US" smtClean="0"/>
-              <a:t>8/30/2023</a:t>
+              <a:t>9/4/2023</a:t>
             </a:fld>
             <a:endParaRPr lang="en-US"/>
           </a:p>
@@ -7774,7 +7774,7 @@
           <a:p>
             <a:fld id="{EA476A42-A091-4468-A075-64A31BE59948}" type="datetime1">
               <a:rPr lang="en-US" smtClean="0"/>
-              <a:t>8/30/2023</a:t>
+              <a:t>9/4/2023</a:t>
             </a:fld>
             <a:endParaRPr lang="en-US"/>
           </a:p>
@@ -8015,7 +8015,7 @@
           <a:p>
             <a:fld id="{54D997E8-DDEE-43F1-8D9B-F8A1E11DE488}" type="datetime1">
               <a:rPr lang="en-US" smtClean="0"/>
-              <a:t>8/30/2023</a:t>
+              <a:t>9/4/2023</a:t>
             </a:fld>
             <a:endParaRPr lang="en-US"/>
           </a:p>
@@ -11554,6 +11554,45 @@
             </a:r>
           </a:p>
           <a:p>
+            <a:r>
+              <a:rPr lang="en-US" dirty="0"/>
+              <a:t>Office Hours </a:t>
+            </a:r>
+          </a:p>
+          <a:p>
+            <a:pPr lvl="1"/>
+            <a:r>
+              <a:rPr lang="en-US" dirty="0"/>
+              <a:t>Schedule is available at (</a:t>
+            </a:r>
+            <a:r>
+              <a:rPr lang="en-US" dirty="0">
+                <a:hlinkClick r:id="rId3"/>
+              </a:rPr>
+              <a:t>https://neu-se.github.io/CS4530-Fall-2023/staff/</a:t>
+            </a:r>
+            <a:r>
+              <a:rPr lang="en-US" dirty="0"/>
+              <a:t>)</a:t>
+            </a:r>
+          </a:p>
+          <a:p>
+            <a:pPr lvl="1"/>
+            <a:r>
+              <a:rPr lang="en-US" dirty="0"/>
+              <a:t>TA Office Hours are held via </a:t>
+            </a:r>
+            <a:r>
+              <a:rPr lang="en-US" b="1" dirty="0"/>
+              <a:t>Khoury Office Hours App</a:t>
+            </a:r>
+            <a:endParaRPr lang="en-US" dirty="0"/>
+          </a:p>
+          <a:p>
+            <a:pPr lvl="1"/>
+            <a:endParaRPr lang="en-US" dirty="0"/>
+          </a:p>
+          <a:p>
             <a:pPr marL="0" indent="0">
               <a:buNone/>
             </a:pPr>
@@ -11963,7 +12002,7 @@
           <a:p>
             <a:r>
               <a:rPr lang="en-US" dirty="0"/>
-              <a:t>Their pictures are on the website</a:t>
+              <a:t>Their contact info and pictures are on the website</a:t>
             </a:r>
           </a:p>
           <a:p>
@@ -13791,7 +13830,7 @@
           </a:ln>
           <a:extLst>
             <a:ext uri="{C572A759-6A51-4108-AA02-DFA0A04FC94B}">
-              <ma14:wrappingTextBoxFlag xmlns:ma14="http://schemas.microsoft.com/office/mac/drawingml/2011/main" xmlns:a14="http://schemas.microsoft.com/office/drawing/2010/main" xmlns:m="http://schemas.openxmlformats.org/officeDocument/2006/math" xmlns="" val="1"/>
+              <ma14:wrappingTextBoxFlag xmlns="" xmlns:m="http://schemas.openxmlformats.org/officeDocument/2006/math" xmlns:a14="http://schemas.microsoft.com/office/drawing/2010/main" xmlns:ma14="http://schemas.microsoft.com/office/mac/drawingml/2011/main" val="1"/>
             </a:ext>
           </a:extLst>
         </p:spPr>
@@ -13852,7 +13891,7 @@
           </a:ln>
           <a:extLst>
             <a:ext uri="{C572A759-6A51-4108-AA02-DFA0A04FC94B}">
-              <ma14:wrappingTextBoxFlag xmlns:ma14="http://schemas.microsoft.com/office/mac/drawingml/2011/main" xmlns:a14="http://schemas.microsoft.com/office/drawing/2010/main" xmlns:m="http://schemas.openxmlformats.org/officeDocument/2006/math" xmlns="" val="1"/>
+              <ma14:wrappingTextBoxFlag xmlns="" xmlns:m="http://schemas.openxmlformats.org/officeDocument/2006/math" xmlns:a14="http://schemas.microsoft.com/office/drawing/2010/main" xmlns:ma14="http://schemas.microsoft.com/office/mac/drawingml/2011/main" val="1"/>
             </a:ext>
           </a:extLst>
         </p:spPr>

</xml_diff>